<commit_message>
Changed picture for installation process
</commit_message>
<xml_diff>
--- a/TSD/OCP_4.x.pptx
+++ b/TSD/OCP_4.x.pptx
@@ -268,7 +268,7 @@
           <a:p>
             <a:fld id="{72618E8B-0904-7141-AC54-068EFD06F207}" type="datetimeFigureOut">
               <a:rPr lang="en-GB" smtClean="0"/>
-              <a:t>16/10/2020</a:t>
+              <a:t>26/03/2021</a:t>
             </a:fld>
             <a:endParaRPr lang="en-GB"/>
           </a:p>
@@ -468,7 +468,7 @@
           <a:p>
             <a:fld id="{72618E8B-0904-7141-AC54-068EFD06F207}" type="datetimeFigureOut">
               <a:rPr lang="en-GB" smtClean="0"/>
-              <a:t>16/10/2020</a:t>
+              <a:t>26/03/2021</a:t>
             </a:fld>
             <a:endParaRPr lang="en-GB"/>
           </a:p>
@@ -678,7 +678,7 @@
           <a:p>
             <a:fld id="{72618E8B-0904-7141-AC54-068EFD06F207}" type="datetimeFigureOut">
               <a:rPr lang="en-GB" smtClean="0"/>
-              <a:t>16/10/2020</a:t>
+              <a:t>26/03/2021</a:t>
             </a:fld>
             <a:endParaRPr lang="en-GB"/>
           </a:p>
@@ -878,7 +878,7 @@
           <a:p>
             <a:fld id="{72618E8B-0904-7141-AC54-068EFD06F207}" type="datetimeFigureOut">
               <a:rPr lang="en-GB" smtClean="0"/>
-              <a:t>16/10/2020</a:t>
+              <a:t>26/03/2021</a:t>
             </a:fld>
             <a:endParaRPr lang="en-GB"/>
           </a:p>
@@ -1154,7 +1154,7 @@
           <a:p>
             <a:fld id="{72618E8B-0904-7141-AC54-068EFD06F207}" type="datetimeFigureOut">
               <a:rPr lang="en-GB" smtClean="0"/>
-              <a:t>16/10/2020</a:t>
+              <a:t>26/03/2021</a:t>
             </a:fld>
             <a:endParaRPr lang="en-GB"/>
           </a:p>
@@ -1422,7 +1422,7 @@
           <a:p>
             <a:fld id="{72618E8B-0904-7141-AC54-068EFD06F207}" type="datetimeFigureOut">
               <a:rPr lang="en-GB" smtClean="0"/>
-              <a:t>16/10/2020</a:t>
+              <a:t>26/03/2021</a:t>
             </a:fld>
             <a:endParaRPr lang="en-GB"/>
           </a:p>
@@ -1837,7 +1837,7 @@
           <a:p>
             <a:fld id="{72618E8B-0904-7141-AC54-068EFD06F207}" type="datetimeFigureOut">
               <a:rPr lang="en-GB" smtClean="0"/>
-              <a:t>16/10/2020</a:t>
+              <a:t>26/03/2021</a:t>
             </a:fld>
             <a:endParaRPr lang="en-GB"/>
           </a:p>
@@ -1979,7 +1979,7 @@
           <a:p>
             <a:fld id="{72618E8B-0904-7141-AC54-068EFD06F207}" type="datetimeFigureOut">
               <a:rPr lang="en-GB" smtClean="0"/>
-              <a:t>16/10/2020</a:t>
+              <a:t>26/03/2021</a:t>
             </a:fld>
             <a:endParaRPr lang="en-GB"/>
           </a:p>
@@ -2092,7 +2092,7 @@
           <a:p>
             <a:fld id="{72618E8B-0904-7141-AC54-068EFD06F207}" type="datetimeFigureOut">
               <a:rPr lang="en-GB" smtClean="0"/>
-              <a:t>16/10/2020</a:t>
+              <a:t>26/03/2021</a:t>
             </a:fld>
             <a:endParaRPr lang="en-GB"/>
           </a:p>
@@ -2405,7 +2405,7 @@
           <a:p>
             <a:fld id="{72618E8B-0904-7141-AC54-068EFD06F207}" type="datetimeFigureOut">
               <a:rPr lang="en-GB" smtClean="0"/>
-              <a:t>16/10/2020</a:t>
+              <a:t>26/03/2021</a:t>
             </a:fld>
             <a:endParaRPr lang="en-GB"/>
           </a:p>
@@ -2694,7 +2694,7 @@
           <a:p>
             <a:fld id="{72618E8B-0904-7141-AC54-068EFD06F207}" type="datetimeFigureOut">
               <a:rPr lang="en-GB" smtClean="0"/>
-              <a:t>16/10/2020</a:t>
+              <a:t>26/03/2021</a:t>
             </a:fld>
             <a:endParaRPr lang="en-GB"/>
           </a:p>
@@ -2940,7 +2940,7 @@
           <a:p>
             <a:fld id="{72618E8B-0904-7141-AC54-068EFD06F207}" type="datetimeFigureOut">
               <a:rPr lang="en-GB" smtClean="0"/>
-              <a:t>16/10/2020</a:t>
+              <a:t>26/03/2021</a:t>
             </a:fld>
             <a:endParaRPr lang="en-GB"/>
           </a:p>
@@ -9876,10 +9876,10 @@
       </p:sp>
       <p:sp>
         <p:nvSpPr>
-          <p:cNvPr id="12" name="Rounded Rectangle 11">
-            <a:extLst>
-              <a:ext uri="{FF2B5EF4-FFF2-40B4-BE49-F238E27FC236}">
-                <a16:creationId xmlns:a16="http://schemas.microsoft.com/office/drawing/2014/main" id="{60F27A78-8F30-9841-ACDE-CE638B9087FC}"/>
+          <p:cNvPr id="14" name="Rounded Rectangle 13">
+            <a:extLst>
+              <a:ext uri="{FF2B5EF4-FFF2-40B4-BE49-F238E27FC236}">
+                <a16:creationId xmlns:a16="http://schemas.microsoft.com/office/drawing/2014/main" id="{E1417516-FB57-594A-8C85-A724F34702A6}"/>
               </a:ext>
             </a:extLst>
           </p:cNvPr>
@@ -9888,8 +9888,8 @@
         </p:nvSpPr>
         <p:spPr>
           <a:xfrm>
-            <a:off x="3057670" y="4752647"/>
-            <a:ext cx="936000" cy="827999"/>
+            <a:off x="4513380" y="4742242"/>
+            <a:ext cx="764873" cy="827999"/>
           </a:xfrm>
           <a:prstGeom prst="roundRect">
             <a:avLst/>
@@ -9920,18 +9920,19 @@
           <a:p>
             <a:pPr algn="ctr"/>
             <a:r>
-              <a:rPr lang="en-NL" sz="1100" dirty="0"/>
-              <a:t>Prepare OpenShift installation</a:t>
-            </a:r>
-          </a:p>
-        </p:txBody>
-      </p:sp>
-      <p:sp>
-        <p:nvSpPr>
-          <p:cNvPr id="14" name="Rounded Rectangle 13">
-            <a:extLst>
-              <a:ext uri="{FF2B5EF4-FFF2-40B4-BE49-F238E27FC236}">
-                <a16:creationId xmlns:a16="http://schemas.microsoft.com/office/drawing/2014/main" id="{E1417516-FB57-594A-8C85-A724F34702A6}"/>
+              <a:rPr lang="en-US" sz="1100" dirty="0"/>
+              <a:t>Start cluster nodes</a:t>
+            </a:r>
+            <a:endParaRPr lang="en-NL" sz="1100" dirty="0"/>
+          </a:p>
+        </p:txBody>
+      </p:sp>
+      <p:sp>
+        <p:nvSpPr>
+          <p:cNvPr id="15" name="Rounded Rectangle 14">
+            <a:extLst>
+              <a:ext uri="{FF2B5EF4-FFF2-40B4-BE49-F238E27FC236}">
+                <a16:creationId xmlns:a16="http://schemas.microsoft.com/office/drawing/2014/main" id="{5FED9655-D57A-6D41-A065-59F8D5D88CD5}"/>
               </a:ext>
             </a:extLst>
           </p:cNvPr>
@@ -9940,8 +9941,8 @@
         </p:nvSpPr>
         <p:spPr>
           <a:xfrm>
-            <a:off x="4278246" y="4742242"/>
-            <a:ext cx="936000" cy="827999"/>
+            <a:off x="5571132" y="4742242"/>
+            <a:ext cx="858615" cy="827999"/>
           </a:xfrm>
           <a:prstGeom prst="roundRect">
             <a:avLst/>
@@ -9973,7 +9974,7 @@
             <a:pPr algn="ctr"/>
             <a:r>
               <a:rPr lang="en-US" sz="1100" dirty="0"/>
-              <a:t>Start cluster nodes</a:t>
+              <a:t>Remove bootstrap</a:t>
             </a:r>
             <a:endParaRPr lang="en-NL" sz="1100" dirty="0"/>
           </a:p>
@@ -9981,10 +9982,10 @@
       </p:sp>
       <p:sp>
         <p:nvSpPr>
-          <p:cNvPr id="15" name="Rounded Rectangle 14">
-            <a:extLst>
-              <a:ext uri="{FF2B5EF4-FFF2-40B4-BE49-F238E27FC236}">
-                <a16:creationId xmlns:a16="http://schemas.microsoft.com/office/drawing/2014/main" id="{5FED9655-D57A-6D41-A065-59F8D5D88CD5}"/>
+          <p:cNvPr id="16" name="Rounded Rectangle 15">
+            <a:extLst>
+              <a:ext uri="{FF2B5EF4-FFF2-40B4-BE49-F238E27FC236}">
+                <a16:creationId xmlns:a16="http://schemas.microsoft.com/office/drawing/2014/main" id="{E0F311D4-D13B-B247-A30B-AEB16B1B6807}"/>
               </a:ext>
             </a:extLst>
           </p:cNvPr>
@@ -9993,8 +9994,8 @@
         </p:nvSpPr>
         <p:spPr>
           <a:xfrm>
-            <a:off x="5493747" y="4742242"/>
-            <a:ext cx="936000" cy="827999"/>
+            <a:off x="6709248" y="1576029"/>
+            <a:ext cx="936000" cy="3994212"/>
           </a:xfrm>
           <a:prstGeom prst="roundRect">
             <a:avLst/>
@@ -10025,19 +10026,18 @@
           <a:p>
             <a:pPr algn="ctr"/>
             <a:r>
-              <a:rPr lang="en-US" sz="1100" dirty="0"/>
-              <a:t>Remove bootstrap</a:t>
-            </a:r>
-            <a:endParaRPr lang="en-NL" sz="1100" dirty="0"/>
-          </a:p>
-        </p:txBody>
-      </p:sp>
-      <p:sp>
-        <p:nvSpPr>
-          <p:cNvPr id="16" name="Rounded Rectangle 15">
-            <a:extLst>
-              <a:ext uri="{FF2B5EF4-FFF2-40B4-BE49-F238E27FC236}">
-                <a16:creationId xmlns:a16="http://schemas.microsoft.com/office/drawing/2014/main" id="{E0F311D4-D13B-B247-A30B-AEB16B1B6807}"/>
+              <a:rPr lang="en-NL" sz="1100" dirty="0"/>
+              <a:t>Wait for installation completion</a:t>
+            </a:r>
+          </a:p>
+        </p:txBody>
+      </p:sp>
+      <p:sp>
+        <p:nvSpPr>
+          <p:cNvPr id="17" name="Rounded Rectangle 16">
+            <a:extLst>
+              <a:ext uri="{FF2B5EF4-FFF2-40B4-BE49-F238E27FC236}">
+                <a16:creationId xmlns:a16="http://schemas.microsoft.com/office/drawing/2014/main" id="{140A0B73-6FA2-2548-9D5C-31EF703CE0AC}"/>
               </a:ext>
             </a:extLst>
           </p:cNvPr>
@@ -10046,8 +10046,8 @@
         </p:nvSpPr>
         <p:spPr>
           <a:xfrm>
-            <a:off x="6709248" y="4742242"/>
-            <a:ext cx="936000" cy="827999"/>
+            <a:off x="7924749" y="1576028"/>
+            <a:ext cx="936000" cy="3994213"/>
           </a:xfrm>
           <a:prstGeom prst="roundRect">
             <a:avLst/>
@@ -10079,17 +10079,17 @@
             <a:pPr algn="ctr"/>
             <a:r>
               <a:rPr lang="en-NL" sz="1100" dirty="0"/>
-              <a:t>Wait for installation completion</a:t>
-            </a:r>
-          </a:p>
-        </p:txBody>
-      </p:sp>
-      <p:sp>
-        <p:nvSpPr>
-          <p:cNvPr id="17" name="Rounded Rectangle 16">
-            <a:extLst>
-              <a:ext uri="{FF2B5EF4-FFF2-40B4-BE49-F238E27FC236}">
-                <a16:creationId xmlns:a16="http://schemas.microsoft.com/office/drawing/2014/main" id="{140A0B73-6FA2-2548-9D5C-31EF703CE0AC}"/>
+              <a:t>Create storage class(es) &amp; Prepare image registry</a:t>
+            </a:r>
+          </a:p>
+        </p:txBody>
+      </p:sp>
+      <p:sp>
+        <p:nvSpPr>
+          <p:cNvPr id="32" name="Triangle 31">
+            <a:extLst>
+              <a:ext uri="{FF2B5EF4-FFF2-40B4-BE49-F238E27FC236}">
+                <a16:creationId xmlns:a16="http://schemas.microsoft.com/office/drawing/2014/main" id="{4B970B82-DD91-D94F-AF3B-587AF3FCCD75}"/>
               </a:ext>
             </a:extLst>
           </p:cNvPr>
@@ -10097,11 +10097,11 @@
           <p:nvPr/>
         </p:nvSpPr>
         <p:spPr>
-          <a:xfrm>
-            <a:off x="7924749" y="4742242"/>
-            <a:ext cx="936000" cy="827999"/>
-          </a:xfrm>
-          <a:prstGeom prst="roundRect">
+          <a:xfrm rot="5400000">
+            <a:off x="5367089" y="5063711"/>
+            <a:ext cx="180000" cy="180000"/>
+          </a:xfrm>
+          <a:prstGeom prst="triangle">
             <a:avLst/>
           </a:prstGeom>
           <a:solidFill>
@@ -10129,19 +10129,16 @@
           <a:lstStyle/>
           <a:p>
             <a:pPr algn="ctr"/>
-            <a:r>
-              <a:rPr lang="en-NL" sz="1100" dirty="0"/>
-              <a:t>Create storage class(es)</a:t>
-            </a:r>
-          </a:p>
-        </p:txBody>
-      </p:sp>
-      <p:sp>
-        <p:nvSpPr>
-          <p:cNvPr id="31" name="Triangle 30">
-            <a:extLst>
-              <a:ext uri="{FF2B5EF4-FFF2-40B4-BE49-F238E27FC236}">
-                <a16:creationId xmlns:a16="http://schemas.microsoft.com/office/drawing/2014/main" id="{46AE9A29-7909-1442-A337-C02DA253D929}"/>
+            <a:endParaRPr lang="en-NL" dirty="0"/>
+          </a:p>
+        </p:txBody>
+      </p:sp>
+      <p:sp>
+        <p:nvSpPr>
+          <p:cNvPr id="33" name="Triangle 32">
+            <a:extLst>
+              <a:ext uri="{FF2B5EF4-FFF2-40B4-BE49-F238E27FC236}">
+                <a16:creationId xmlns:a16="http://schemas.microsoft.com/office/drawing/2014/main" id="{52DC307C-DF45-3343-A34D-A4608B88A301}"/>
               </a:ext>
             </a:extLst>
           </p:cNvPr>
@@ -10150,7 +10147,7 @@
         </p:nvSpPr>
         <p:spPr>
           <a:xfrm rot="5400000">
-            <a:off x="4050056" y="5063790"/>
+            <a:off x="6515395" y="5063711"/>
             <a:ext cx="180000" cy="180000"/>
           </a:xfrm>
           <a:prstGeom prst="triangle">
@@ -10187,10 +10184,10 @@
       </p:sp>
       <p:sp>
         <p:nvSpPr>
-          <p:cNvPr id="32" name="Triangle 31">
-            <a:extLst>
-              <a:ext uri="{FF2B5EF4-FFF2-40B4-BE49-F238E27FC236}">
-                <a16:creationId xmlns:a16="http://schemas.microsoft.com/office/drawing/2014/main" id="{4B970B82-DD91-D94F-AF3B-587AF3FCCD75}"/>
+          <p:cNvPr id="34" name="Triangle 33">
+            <a:extLst>
+              <a:ext uri="{FF2B5EF4-FFF2-40B4-BE49-F238E27FC236}">
+                <a16:creationId xmlns:a16="http://schemas.microsoft.com/office/drawing/2014/main" id="{21FE2103-0EB6-EB40-BEB5-92129FB1ED99}"/>
               </a:ext>
             </a:extLst>
           </p:cNvPr>
@@ -10199,7 +10196,7 @@
         </p:nvSpPr>
         <p:spPr>
           <a:xfrm rot="5400000">
-            <a:off x="5257361" y="5063711"/>
+            <a:off x="7717043" y="3483134"/>
             <a:ext cx="180000" cy="180000"/>
           </a:xfrm>
           <a:prstGeom prst="triangle">
@@ -10236,10 +10233,10 @@
       </p:sp>
       <p:sp>
         <p:nvSpPr>
-          <p:cNvPr id="33" name="Triangle 32">
-            <a:extLst>
-              <a:ext uri="{FF2B5EF4-FFF2-40B4-BE49-F238E27FC236}">
-                <a16:creationId xmlns:a16="http://schemas.microsoft.com/office/drawing/2014/main" id="{52DC307C-DF45-3343-A34D-A4608B88A301}"/>
+          <p:cNvPr id="38" name="Rounded Rectangle 37">
+            <a:extLst>
+              <a:ext uri="{FF2B5EF4-FFF2-40B4-BE49-F238E27FC236}">
+                <a16:creationId xmlns:a16="http://schemas.microsoft.com/office/drawing/2014/main" id="{2E3AAF9F-0B74-7741-8D4D-8BAD9E0B1BE8}"/>
               </a:ext>
             </a:extLst>
           </p:cNvPr>
@@ -10247,11 +10244,11 @@
           <p:nvPr/>
         </p:nvSpPr>
         <p:spPr>
-          <a:xfrm rot="5400000">
-            <a:off x="6516850" y="5063711"/>
-            <a:ext cx="180000" cy="180000"/>
-          </a:xfrm>
-          <a:prstGeom prst="triangle">
+          <a:xfrm>
+            <a:off x="308681" y="2770834"/>
+            <a:ext cx="853750" cy="510715"/>
+          </a:xfrm>
+          <a:prstGeom prst="roundRect">
             <a:avLst/>
           </a:prstGeom>
           <a:solidFill>
@@ -10279,107 +10276,9 @@
           <a:lstStyle/>
           <a:p>
             <a:pPr algn="ctr"/>
-            <a:endParaRPr lang="en-NL" dirty="0"/>
-          </a:p>
-        </p:txBody>
-      </p:sp>
-      <p:sp>
-        <p:nvSpPr>
-          <p:cNvPr id="34" name="Triangle 33">
-            <a:extLst>
-              <a:ext uri="{FF2B5EF4-FFF2-40B4-BE49-F238E27FC236}">
-                <a16:creationId xmlns:a16="http://schemas.microsoft.com/office/drawing/2014/main" id="{21FE2103-0EB6-EB40-BEB5-92129FB1ED99}"/>
-              </a:ext>
-            </a:extLst>
-          </p:cNvPr>
-          <p:cNvSpPr/>
-          <p:nvPr/>
-        </p:nvSpPr>
-        <p:spPr>
-          <a:xfrm rot="5400000">
-            <a:off x="7720821" y="5076648"/>
-            <a:ext cx="180000" cy="180000"/>
-          </a:xfrm>
-          <a:prstGeom prst="triangle">
-            <a:avLst/>
-          </a:prstGeom>
-          <a:solidFill>
-            <a:schemeClr val="accent6"/>
-          </a:solidFill>
-        </p:spPr>
-        <p:style>
-          <a:lnRef idx="2">
-            <a:schemeClr val="accent1">
-              <a:shade val="50000"/>
-            </a:schemeClr>
-          </a:lnRef>
-          <a:fillRef idx="1">
-            <a:schemeClr val="accent1"/>
-          </a:fillRef>
-          <a:effectRef idx="0">
-            <a:schemeClr val="accent1"/>
-          </a:effectRef>
-          <a:fontRef idx="minor">
-            <a:schemeClr val="lt1"/>
-          </a:fontRef>
-        </p:style>
-        <p:txBody>
-          <a:bodyPr rtlCol="0" anchor="ctr"/>
-          <a:lstStyle/>
-          <a:p>
-            <a:pPr algn="ctr"/>
-            <a:endParaRPr lang="en-NL" dirty="0"/>
-          </a:p>
-        </p:txBody>
-      </p:sp>
-      <p:sp>
-        <p:nvSpPr>
-          <p:cNvPr id="38" name="Rounded Rectangle 37">
-            <a:extLst>
-              <a:ext uri="{FF2B5EF4-FFF2-40B4-BE49-F238E27FC236}">
-                <a16:creationId xmlns:a16="http://schemas.microsoft.com/office/drawing/2014/main" id="{2E3AAF9F-0B74-7741-8D4D-8BAD9E0B1BE8}"/>
-              </a:ext>
-            </a:extLst>
-          </p:cNvPr>
-          <p:cNvSpPr/>
-          <p:nvPr/>
-        </p:nvSpPr>
-        <p:spPr>
-          <a:xfrm>
-            <a:off x="178635" y="2720037"/>
-            <a:ext cx="1184953" cy="457528"/>
-          </a:xfrm>
-          <a:prstGeom prst="roundRect">
-            <a:avLst/>
-          </a:prstGeom>
-          <a:solidFill>
-            <a:schemeClr val="accent6"/>
-          </a:solidFill>
-        </p:spPr>
-        <p:style>
-          <a:lnRef idx="2">
-            <a:schemeClr val="accent1">
-              <a:shade val="50000"/>
-            </a:schemeClr>
-          </a:lnRef>
-          <a:fillRef idx="1">
-            <a:schemeClr val="accent1"/>
-          </a:fillRef>
-          <a:effectRef idx="0">
-            <a:schemeClr val="accent1"/>
-          </a:effectRef>
-          <a:fontRef idx="minor">
-            <a:schemeClr val="lt1"/>
-          </a:fontRef>
-        </p:style>
-        <p:txBody>
-          <a:bodyPr rtlCol="0" anchor="ctr"/>
-          <a:lstStyle/>
-          <a:p>
-            <a:pPr algn="ctr"/>
             <a:r>
               <a:rPr lang="en-NL" sz="1100" dirty="0"/>
-              <a:t>Update inventory file</a:t>
+              <a:t>Clone Git repo</a:t>
             </a:r>
           </a:p>
         </p:txBody>
@@ -10395,18 +10294,20 @@
           </p:cNvPr>
           <p:cNvCxnSpPr>
             <a:cxnSpLocks/>
-            <a:stCxn id="78" idx="2"/>
-            <a:endCxn id="12" idx="1"/>
+            <a:stCxn id="78" idx="3"/>
+            <a:endCxn id="93" idx="1"/>
           </p:cNvCxnSpPr>
           <p:nvPr/>
         </p:nvCxnSpPr>
         <p:spPr>
-          <a:xfrm rot="16200000" flipH="1">
-            <a:off x="1274046" y="3383022"/>
-            <a:ext cx="1280691" cy="2286558"/>
-          </a:xfrm>
-          <a:prstGeom prst="bentConnector2">
-            <a:avLst/>
+          <a:xfrm>
+            <a:off x="1162431" y="5154176"/>
+            <a:ext cx="2149906" cy="4109"/>
+          </a:xfrm>
+          <a:prstGeom prst="bentConnector3">
+            <a:avLst>
+              <a:gd name="adj1" fmla="val 50000"/>
+            </a:avLst>
           </a:prstGeom>
           <a:ln w="38100">
             <a:solidFill>
@@ -10447,7 +10348,7 @@
         <p:spPr>
           <a:xfrm flipV="1">
             <a:off x="114750" y="6281416"/>
-            <a:ext cx="2662642" cy="1"/>
+            <a:ext cx="2169052" cy="5"/>
           </a:xfrm>
           <a:prstGeom prst="straightConnector1">
             <a:avLst/>
@@ -10489,8 +10390,8 @@
         </p:nvSpPr>
         <p:spPr>
           <a:xfrm>
-            <a:off x="768425" y="6334780"/>
-            <a:ext cx="1190326" cy="307777"/>
+            <a:off x="277070" y="6334780"/>
+            <a:ext cx="1343381" cy="307777"/>
           </a:xfrm>
           <a:prstGeom prst="rect">
             <a:avLst/>
@@ -10508,7 +10409,7 @@
           <a:p>
             <a:r>
               <a:rPr lang="en-NL" sz="1400" dirty="0"/>
-              <a:t>Infrastructure</a:t>
+              <a:t>Bastion (+ infra)</a:t>
             </a:r>
           </a:p>
         </p:txBody>
@@ -10529,8 +10430,8 @@
         </p:nvCxnSpPr>
         <p:spPr>
           <a:xfrm>
-            <a:off x="2777392" y="6281416"/>
-            <a:ext cx="1621682" cy="1"/>
+            <a:off x="2295144" y="6281417"/>
+            <a:ext cx="2103930" cy="0"/>
           </a:xfrm>
           <a:prstGeom prst="straightConnector1">
             <a:avLst/>
@@ -10572,8 +10473,8 @@
         </p:nvSpPr>
         <p:spPr>
           <a:xfrm>
-            <a:off x="2849980" y="6334780"/>
-            <a:ext cx="1609801" cy="523220"/>
+            <a:off x="2759751" y="6332768"/>
+            <a:ext cx="1295739" cy="307777"/>
           </a:xfrm>
           <a:prstGeom prst="rect">
             <a:avLst/>
@@ -10592,14 +10493,7 @@
             <a:pPr algn="ctr"/>
             <a:r>
               <a:rPr lang="en-NL" sz="1400" dirty="0"/>
-              <a:t>Prepare  OpenShift </a:t>
-            </a:r>
-            <a:br>
-              <a:rPr lang="en-NL" sz="1400" dirty="0"/>
-            </a:br>
-            <a:r>
-              <a:rPr lang="en-NL" sz="1400" dirty="0"/>
-              <a:t>installation</a:t>
+              <a:t>Prepare &amp; infra</a:t>
             </a:r>
           </a:p>
         </p:txBody>
@@ -10703,7 +10597,7 @@
         </p:nvSpPr>
         <p:spPr>
           <a:xfrm>
-            <a:off x="1168693" y="5783854"/>
+            <a:off x="998418" y="5783854"/>
             <a:ext cx="401715" cy="342295"/>
           </a:xfrm>
           <a:prstGeom prst="ellipse">
@@ -10760,7 +10654,7 @@
         </p:nvSpPr>
         <p:spPr>
           <a:xfrm>
-            <a:off x="3491476" y="5783854"/>
+            <a:off x="3206762" y="5783854"/>
             <a:ext cx="401715" cy="342295"/>
           </a:xfrm>
           <a:prstGeom prst="ellipse">
@@ -10931,8 +10825,8 @@
         </p:nvSpPr>
         <p:spPr>
           <a:xfrm>
-            <a:off x="9140250" y="4742242"/>
-            <a:ext cx="936000" cy="827999"/>
+            <a:off x="9140250" y="1576028"/>
+            <a:ext cx="936000" cy="3994213"/>
           </a:xfrm>
           <a:prstGeom prst="roundRect">
             <a:avLst/>
@@ -10983,7 +10877,7 @@
         </p:nvSpPr>
         <p:spPr>
           <a:xfrm rot="5400000">
-            <a:off x="8924270" y="5050876"/>
+            <a:off x="8946397" y="3483134"/>
             <a:ext cx="180000" cy="180000"/>
           </a:xfrm>
           <a:prstGeom prst="triangle">
@@ -11117,8 +11011,8 @@
         </p:nvSpPr>
         <p:spPr>
           <a:xfrm>
-            <a:off x="10355751" y="4742242"/>
-            <a:ext cx="936000" cy="827999"/>
+            <a:off x="10355751" y="1576028"/>
+            <a:ext cx="936000" cy="3994213"/>
           </a:xfrm>
           <a:prstGeom prst="roundRect">
             <a:avLst/>
@@ -11170,7 +11064,7 @@
         </p:nvSpPr>
         <p:spPr>
           <a:xfrm rot="5400000">
-            <a:off x="10112230" y="5063711"/>
+            <a:off x="10148045" y="3483134"/>
             <a:ext cx="180000" cy="180000"/>
           </a:xfrm>
           <a:prstGeom prst="triangle">
@@ -11219,8 +11113,8 @@
         </p:nvSpPr>
         <p:spPr>
           <a:xfrm>
-            <a:off x="911076" y="1242309"/>
-            <a:ext cx="1184953" cy="825826"/>
+            <a:off x="310077" y="1577361"/>
+            <a:ext cx="853756" cy="787705"/>
           </a:xfrm>
           <a:prstGeom prst="roundRect">
             <a:avLst/>
@@ -11275,8 +11169,8 @@
         </p:nvCxnSpPr>
         <p:spPr>
           <a:xfrm flipH="1">
-            <a:off x="771112" y="2068135"/>
-            <a:ext cx="732441" cy="651902"/>
+            <a:off x="735556" y="2365066"/>
+            <a:ext cx="1399" cy="405768"/>
           </a:xfrm>
           <a:prstGeom prst="straightConnector1">
             <a:avLst/>
@@ -11317,8 +11211,8 @@
         </p:nvSpPr>
         <p:spPr>
           <a:xfrm>
-            <a:off x="178635" y="3428429"/>
-            <a:ext cx="1184953" cy="457527"/>
+            <a:off x="308681" y="4742241"/>
+            <a:ext cx="853750" cy="823869"/>
           </a:xfrm>
           <a:prstGeom prst="roundRect">
             <a:avLst/>
@@ -11350,7 +11244,7 @@
             <a:pPr algn="ctr"/>
             <a:r>
               <a:rPr lang="en-NL" sz="1100" dirty="0"/>
-              <a:t>Create cluster nodes (auto)</a:t>
+              <a:t>Run prepare script</a:t>
             </a:r>
           </a:p>
         </p:txBody>
@@ -11367,14 +11261,14 @@
           <p:cNvCxnSpPr>
             <a:cxnSpLocks/>
             <a:stCxn id="38" idx="2"/>
-            <a:endCxn id="78" idx="0"/>
+            <a:endCxn id="60" idx="0"/>
           </p:cNvCxnSpPr>
           <p:nvPr/>
         </p:nvCxnSpPr>
         <p:spPr>
           <a:xfrm>
-            <a:off x="771112" y="3177565"/>
-            <a:ext cx="0" cy="250864"/>
+            <a:off x="735556" y="3281549"/>
+            <a:ext cx="6257" cy="451235"/>
           </a:xfrm>
           <a:prstGeom prst="straightConnector1">
             <a:avLst/>
@@ -11415,8 +11309,8 @@
         </p:nvSpPr>
         <p:spPr>
           <a:xfrm>
-            <a:off x="1592440" y="2706063"/>
-            <a:ext cx="1184953" cy="457528"/>
+            <a:off x="3312337" y="4746335"/>
+            <a:ext cx="922725" cy="823900"/>
           </a:xfrm>
           <a:prstGeom prst="roundRect">
             <a:avLst/>
@@ -11424,6 +11318,12 @@
           <a:solidFill>
             <a:schemeClr val="accent6"/>
           </a:solidFill>
+          <a:ln>
+            <a:solidFill>
+              <a:schemeClr val="tx1"/>
+            </a:solidFill>
+            <a:prstDash val="dash"/>
+          </a:ln>
         </p:spPr>
         <p:style>
           <a:lnRef idx="2">
@@ -11448,17 +11348,147 @@
             <a:pPr algn="ctr"/>
             <a:r>
               <a:rPr lang="en-NL" sz="1100" dirty="0"/>
-              <a:t>Create cluster nodes (manual)</a:t>
-            </a:r>
-          </a:p>
-        </p:txBody>
-      </p:sp>
-      <p:sp>
-        <p:nvSpPr>
-          <p:cNvPr id="94" name="Rounded Rectangle 93">
-            <a:extLst>
-              <a:ext uri="{FF2B5EF4-FFF2-40B4-BE49-F238E27FC236}">
-                <a16:creationId xmlns:a16="http://schemas.microsoft.com/office/drawing/2014/main" id="{E3E53564-B78C-964F-A8A5-AC490EA307BF}"/>
+              <a:t>Create cluster nodes (auto)</a:t>
+            </a:r>
+          </a:p>
+        </p:txBody>
+      </p:sp>
+      <p:cxnSp>
+        <p:nvCxnSpPr>
+          <p:cNvPr id="42" name="Straight Arrow Connector 41">
+            <a:extLst>
+              <a:ext uri="{FF2B5EF4-FFF2-40B4-BE49-F238E27FC236}">
+                <a16:creationId xmlns:a16="http://schemas.microsoft.com/office/drawing/2014/main" id="{56296071-38EC-F24A-8ADD-E68BFD058EC4}"/>
+              </a:ext>
+            </a:extLst>
+          </p:cNvPr>
+          <p:cNvCxnSpPr>
+            <a:cxnSpLocks/>
+          </p:cNvCxnSpPr>
+          <p:nvPr/>
+        </p:nvCxnSpPr>
+        <p:spPr>
+          <a:xfrm>
+            <a:off x="7847564" y="6281416"/>
+            <a:ext cx="1200159" cy="0"/>
+          </a:xfrm>
+          <a:prstGeom prst="straightConnector1">
+            <a:avLst/>
+          </a:prstGeom>
+          <a:ln w="38100">
+            <a:solidFill>
+              <a:schemeClr val="accent2"/>
+            </a:solidFill>
+            <a:headEnd type="triangle"/>
+            <a:tailEnd type="triangle"/>
+          </a:ln>
+        </p:spPr>
+        <p:style>
+          <a:lnRef idx="1">
+            <a:schemeClr val="accent1"/>
+          </a:lnRef>
+          <a:fillRef idx="0">
+            <a:schemeClr val="accent1"/>
+          </a:fillRef>
+          <a:effectRef idx="0">
+            <a:schemeClr val="accent1"/>
+          </a:effectRef>
+          <a:fontRef idx="minor">
+            <a:schemeClr val="tx1"/>
+          </a:fontRef>
+        </p:style>
+      </p:cxnSp>
+      <p:sp>
+        <p:nvSpPr>
+          <p:cNvPr id="43" name="TextBox 42">
+            <a:extLst>
+              <a:ext uri="{FF2B5EF4-FFF2-40B4-BE49-F238E27FC236}">
+                <a16:creationId xmlns:a16="http://schemas.microsoft.com/office/drawing/2014/main" id="{9687D5F9-72AC-7C44-A2A1-83079E90B0EB}"/>
+              </a:ext>
+            </a:extLst>
+          </p:cNvPr>
+          <p:cNvSpPr txBox="1"/>
+          <p:nvPr/>
+        </p:nvSpPr>
+        <p:spPr>
+          <a:xfrm>
+            <a:off x="9249321" y="6334780"/>
+            <a:ext cx="980525" cy="307777"/>
+          </a:xfrm>
+          <a:prstGeom prst="rect">
+            <a:avLst/>
+          </a:prstGeom>
+          <a:noFill/>
+          <a:ln>
+            <a:noFill/>
+          </a:ln>
+        </p:spPr>
+        <p:txBody>
+          <a:bodyPr wrap="none" rtlCol="0">
+            <a:spAutoFit/>
+          </a:bodyPr>
+          <a:lstStyle/>
+          <a:p>
+            <a:pPr algn="ctr"/>
+            <a:r>
+              <a:rPr lang="en-US" sz="1400" dirty="0"/>
+              <a:t>Post-install</a:t>
+            </a:r>
+            <a:endParaRPr lang="en-NL" sz="1400" dirty="0"/>
+          </a:p>
+        </p:txBody>
+      </p:sp>
+      <p:cxnSp>
+        <p:nvCxnSpPr>
+          <p:cNvPr id="47" name="Straight Arrow Connector 46">
+            <a:extLst>
+              <a:ext uri="{FF2B5EF4-FFF2-40B4-BE49-F238E27FC236}">
+                <a16:creationId xmlns:a16="http://schemas.microsoft.com/office/drawing/2014/main" id="{C8284243-CC0B-D344-A3D0-F69913805489}"/>
+              </a:ext>
+            </a:extLst>
+          </p:cNvPr>
+          <p:cNvCxnSpPr>
+            <a:cxnSpLocks/>
+          </p:cNvCxnSpPr>
+          <p:nvPr/>
+        </p:nvCxnSpPr>
+        <p:spPr>
+          <a:xfrm>
+            <a:off x="9047723" y="6281416"/>
+            <a:ext cx="1251357" cy="0"/>
+          </a:xfrm>
+          <a:prstGeom prst="straightConnector1">
+            <a:avLst/>
+          </a:prstGeom>
+          <a:ln w="38100">
+            <a:solidFill>
+              <a:schemeClr val="accent2"/>
+            </a:solidFill>
+            <a:headEnd type="triangle"/>
+            <a:tailEnd type="triangle"/>
+          </a:ln>
+        </p:spPr>
+        <p:style>
+          <a:lnRef idx="1">
+            <a:schemeClr val="accent1"/>
+          </a:lnRef>
+          <a:fillRef idx="0">
+            <a:schemeClr val="accent1"/>
+          </a:fillRef>
+          <a:effectRef idx="0">
+            <a:schemeClr val="accent1"/>
+          </a:effectRef>
+          <a:fontRef idx="minor">
+            <a:schemeClr val="tx1"/>
+          </a:fontRef>
+        </p:style>
+      </p:cxnSp>
+      <p:sp>
+        <p:nvSpPr>
+          <p:cNvPr id="48" name="Oval 47">
+            <a:extLst>
+              <a:ext uri="{FF2B5EF4-FFF2-40B4-BE49-F238E27FC236}">
+                <a16:creationId xmlns:a16="http://schemas.microsoft.com/office/drawing/2014/main" id="{DEF65D1C-BB80-5241-8DD8-13AEF63D07A4}"/>
               </a:ext>
             </a:extLst>
           </p:cNvPr>
@@ -11467,15 +11497,20 @@
         </p:nvSpPr>
         <p:spPr>
           <a:xfrm>
-            <a:off x="1592439" y="3434650"/>
-            <a:ext cx="1184953" cy="457528"/>
-          </a:xfrm>
-          <a:prstGeom prst="roundRect">
+            <a:off x="8215708" y="5783854"/>
+            <a:ext cx="401715" cy="342295"/>
+          </a:xfrm>
+          <a:prstGeom prst="ellipse">
             <a:avLst/>
           </a:prstGeom>
           <a:solidFill>
-            <a:schemeClr val="accent6"/>
+            <a:schemeClr val="accent3"/>
           </a:solidFill>
+          <a:ln>
+            <a:solidFill>
+              <a:schemeClr val="accent2"/>
+            </a:solidFill>
+          </a:ln>
         </p:spPr>
         <p:style>
           <a:lnRef idx="2">
@@ -11499,6 +11534,225 @@
           <a:p>
             <a:pPr algn="ctr"/>
             <a:r>
+              <a:rPr lang="en-NL" dirty="0"/>
+              <a:t>4</a:t>
+            </a:r>
+          </a:p>
+        </p:txBody>
+      </p:sp>
+      <p:sp>
+        <p:nvSpPr>
+          <p:cNvPr id="49" name="Oval 48">
+            <a:extLst>
+              <a:ext uri="{FF2B5EF4-FFF2-40B4-BE49-F238E27FC236}">
+                <a16:creationId xmlns:a16="http://schemas.microsoft.com/office/drawing/2014/main" id="{89B77375-8166-E74E-93C6-F684AC3250CA}"/>
+              </a:ext>
+            </a:extLst>
+          </p:cNvPr>
+          <p:cNvSpPr/>
+          <p:nvPr/>
+        </p:nvSpPr>
+        <p:spPr>
+          <a:xfrm>
+            <a:off x="9472543" y="5783854"/>
+            <a:ext cx="401715" cy="342295"/>
+          </a:xfrm>
+          <a:prstGeom prst="ellipse">
+            <a:avLst/>
+          </a:prstGeom>
+          <a:solidFill>
+            <a:schemeClr val="accent3"/>
+          </a:solidFill>
+          <a:ln>
+            <a:solidFill>
+              <a:schemeClr val="accent2"/>
+            </a:solidFill>
+          </a:ln>
+        </p:spPr>
+        <p:style>
+          <a:lnRef idx="2">
+            <a:schemeClr val="accent1">
+              <a:shade val="50000"/>
+            </a:schemeClr>
+          </a:lnRef>
+          <a:fillRef idx="1">
+            <a:schemeClr val="accent1"/>
+          </a:fillRef>
+          <a:effectRef idx="0">
+            <a:schemeClr val="accent1"/>
+          </a:effectRef>
+          <a:fontRef idx="minor">
+            <a:schemeClr val="lt1"/>
+          </a:fontRef>
+        </p:style>
+        <p:txBody>
+          <a:bodyPr rtlCol="0" anchor="ctr"/>
+          <a:lstStyle/>
+          <a:p>
+            <a:pPr algn="ctr"/>
+            <a:r>
+              <a:rPr lang="en-NL" dirty="0"/>
+              <a:t>5</a:t>
+            </a:r>
+          </a:p>
+        </p:txBody>
+      </p:sp>
+      <p:sp>
+        <p:nvSpPr>
+          <p:cNvPr id="50" name="TextBox 49">
+            <a:extLst>
+              <a:ext uri="{FF2B5EF4-FFF2-40B4-BE49-F238E27FC236}">
+                <a16:creationId xmlns:a16="http://schemas.microsoft.com/office/drawing/2014/main" id="{B483331D-9834-B64C-B31A-BBD03968B80B}"/>
+              </a:ext>
+            </a:extLst>
+          </p:cNvPr>
+          <p:cNvSpPr txBox="1"/>
+          <p:nvPr/>
+        </p:nvSpPr>
+        <p:spPr>
+          <a:xfrm>
+            <a:off x="8095432" y="6334780"/>
+            <a:ext cx="738857" cy="307777"/>
+          </a:xfrm>
+          <a:prstGeom prst="rect">
+            <a:avLst/>
+          </a:prstGeom>
+          <a:noFill/>
+          <a:ln>
+            <a:noFill/>
+          </a:ln>
+        </p:spPr>
+        <p:txBody>
+          <a:bodyPr wrap="none" rtlCol="0">
+            <a:spAutoFit/>
+          </a:bodyPr>
+          <a:lstStyle/>
+          <a:p>
+            <a:pPr algn="ctr"/>
+            <a:r>
+              <a:rPr lang="en-US" sz="1400" dirty="0"/>
+              <a:t>Storage</a:t>
+            </a:r>
+            <a:endParaRPr lang="en-NL" sz="1400" dirty="0"/>
+          </a:p>
+        </p:txBody>
+      </p:sp>
+      <p:sp>
+        <p:nvSpPr>
+          <p:cNvPr id="10" name="TextBox 9">
+            <a:extLst>
+              <a:ext uri="{FF2B5EF4-FFF2-40B4-BE49-F238E27FC236}">
+                <a16:creationId xmlns:a16="http://schemas.microsoft.com/office/drawing/2014/main" id="{89B49D52-9E2F-174F-8414-0E7899417D0F}"/>
+              </a:ext>
+            </a:extLst>
+          </p:cNvPr>
+          <p:cNvSpPr txBox="1"/>
+          <p:nvPr/>
+        </p:nvSpPr>
+        <p:spPr>
+          <a:xfrm>
+            <a:off x="2642510" y="4820724"/>
+            <a:ext cx="437940" cy="307777"/>
+          </a:xfrm>
+          <a:prstGeom prst="rect">
+            <a:avLst/>
+          </a:prstGeom>
+          <a:noFill/>
+        </p:spPr>
+        <p:txBody>
+          <a:bodyPr wrap="none" rtlCol="0">
+            <a:spAutoFit/>
+          </a:bodyPr>
+          <a:lstStyle/>
+          <a:p>
+            <a:r>
+              <a:rPr lang="en-NL" sz="1400" dirty="0"/>
+              <a:t>UPI</a:t>
+            </a:r>
+          </a:p>
+        </p:txBody>
+      </p:sp>
+      <p:sp>
+        <p:nvSpPr>
+          <p:cNvPr id="59" name="TextBox 58">
+            <a:extLst>
+              <a:ext uri="{FF2B5EF4-FFF2-40B4-BE49-F238E27FC236}">
+                <a16:creationId xmlns:a16="http://schemas.microsoft.com/office/drawing/2014/main" id="{488C6BB5-62A1-7C4A-9123-8FD4DFD232C9}"/>
+              </a:ext>
+            </a:extLst>
+          </p:cNvPr>
+          <p:cNvSpPr txBox="1"/>
+          <p:nvPr/>
+        </p:nvSpPr>
+        <p:spPr>
+          <a:xfrm>
+            <a:off x="2576047" y="1599953"/>
+            <a:ext cx="367408" cy="307777"/>
+          </a:xfrm>
+          <a:prstGeom prst="rect">
+            <a:avLst/>
+          </a:prstGeom>
+          <a:noFill/>
+        </p:spPr>
+        <p:txBody>
+          <a:bodyPr wrap="none" rtlCol="0">
+            <a:spAutoFit/>
+          </a:bodyPr>
+          <a:lstStyle/>
+          <a:p>
+            <a:r>
+              <a:rPr lang="en-NL" sz="1400" dirty="0"/>
+              <a:t>IPI</a:t>
+            </a:r>
+          </a:p>
+        </p:txBody>
+      </p:sp>
+      <p:sp>
+        <p:nvSpPr>
+          <p:cNvPr id="60" name="Rounded Rectangle 59">
+            <a:extLst>
+              <a:ext uri="{FF2B5EF4-FFF2-40B4-BE49-F238E27FC236}">
+                <a16:creationId xmlns:a16="http://schemas.microsoft.com/office/drawing/2014/main" id="{E0C6697D-C482-214B-B64E-3F86BABF10BB}"/>
+              </a:ext>
+            </a:extLst>
+          </p:cNvPr>
+          <p:cNvSpPr/>
+          <p:nvPr/>
+        </p:nvSpPr>
+        <p:spPr>
+          <a:xfrm>
+            <a:off x="314938" y="3732784"/>
+            <a:ext cx="853750" cy="558928"/>
+          </a:xfrm>
+          <a:prstGeom prst="roundRect">
+            <a:avLst/>
+          </a:prstGeom>
+          <a:solidFill>
+            <a:schemeClr val="accent6"/>
+          </a:solidFill>
+        </p:spPr>
+        <p:style>
+          <a:lnRef idx="2">
+            <a:schemeClr val="accent1">
+              <a:shade val="50000"/>
+            </a:schemeClr>
+          </a:lnRef>
+          <a:fillRef idx="1">
+            <a:schemeClr val="accent1"/>
+          </a:fillRef>
+          <a:effectRef idx="0">
+            <a:schemeClr val="accent1"/>
+          </a:effectRef>
+          <a:fontRef idx="minor">
+            <a:schemeClr val="lt1"/>
+          </a:fontRef>
+        </p:style>
+        <p:txBody>
+          <a:bodyPr rtlCol="0" anchor="ctr"/>
+          <a:lstStyle/>
+          <a:p>
+            <a:pPr algn="ctr"/>
+            <a:r>
               <a:rPr lang="en-NL" sz="1100" dirty="0"/>
               <a:t>Update inventory file</a:t>
             </a:r>
@@ -11507,27 +11761,127 @@
       </p:sp>
       <p:cxnSp>
         <p:nvCxnSpPr>
-          <p:cNvPr id="95" name="Straight Arrow Connector 94">
-            <a:extLst>
-              <a:ext uri="{FF2B5EF4-FFF2-40B4-BE49-F238E27FC236}">
-                <a16:creationId xmlns:a16="http://schemas.microsoft.com/office/drawing/2014/main" id="{6BEE9428-8750-154C-AC8D-E7EB8D64C6D7}"/>
+          <p:cNvPr id="63" name="Straight Arrow Connector 62">
+            <a:extLst>
+              <a:ext uri="{FF2B5EF4-FFF2-40B4-BE49-F238E27FC236}">
+                <a16:creationId xmlns:a16="http://schemas.microsoft.com/office/drawing/2014/main" id="{F6239049-B79F-2C4C-8295-32B0F5D82FFA}"/>
               </a:ext>
             </a:extLst>
           </p:cNvPr>
           <p:cNvCxnSpPr>
             <a:cxnSpLocks/>
-            <a:stCxn id="58" idx="2"/>
-            <a:endCxn id="93" idx="0"/>
+            <a:stCxn id="60" idx="2"/>
+            <a:endCxn id="78" idx="0"/>
           </p:cNvCxnSpPr>
           <p:nvPr/>
         </p:nvCxnSpPr>
         <p:spPr>
-          <a:xfrm>
-            <a:off x="1503553" y="2068135"/>
-            <a:ext cx="681364" cy="637928"/>
+          <a:xfrm flipH="1">
+            <a:off x="735556" y="4291712"/>
+            <a:ext cx="6257" cy="450529"/>
           </a:xfrm>
           <a:prstGeom prst="straightConnector1">
             <a:avLst/>
+          </a:prstGeom>
+          <a:ln w="38100">
+            <a:solidFill>
+              <a:schemeClr val="accent6"/>
+            </a:solidFill>
+            <a:tailEnd type="triangle"/>
+          </a:ln>
+        </p:spPr>
+        <p:style>
+          <a:lnRef idx="1">
+            <a:schemeClr val="accent1"/>
+          </a:lnRef>
+          <a:fillRef idx="0">
+            <a:schemeClr val="accent1"/>
+          </a:fillRef>
+          <a:effectRef idx="0">
+            <a:schemeClr val="accent1"/>
+          </a:effectRef>
+          <a:fontRef idx="minor">
+            <a:schemeClr val="tx1"/>
+          </a:fontRef>
+        </p:style>
+      </p:cxnSp>
+      <p:sp>
+        <p:nvSpPr>
+          <p:cNvPr id="81" name="Rounded Rectangle 80">
+            <a:extLst>
+              <a:ext uri="{FF2B5EF4-FFF2-40B4-BE49-F238E27FC236}">
+                <a16:creationId xmlns:a16="http://schemas.microsoft.com/office/drawing/2014/main" id="{F4858330-4FF0-BD46-AC6A-15EEBF8CF27F}"/>
+              </a:ext>
+            </a:extLst>
+          </p:cNvPr>
+          <p:cNvSpPr/>
+          <p:nvPr/>
+        </p:nvSpPr>
+        <p:spPr>
+          <a:xfrm>
+            <a:off x="3288294" y="1576028"/>
+            <a:ext cx="946768" cy="638598"/>
+          </a:xfrm>
+          <a:prstGeom prst="roundRect">
+            <a:avLst/>
+          </a:prstGeom>
+          <a:solidFill>
+            <a:schemeClr val="accent6"/>
+          </a:solidFill>
+        </p:spPr>
+        <p:style>
+          <a:lnRef idx="2">
+            <a:schemeClr val="accent1">
+              <a:shade val="50000"/>
+            </a:schemeClr>
+          </a:lnRef>
+          <a:fillRef idx="1">
+            <a:schemeClr val="accent1"/>
+          </a:fillRef>
+          <a:effectRef idx="0">
+            <a:schemeClr val="accent1"/>
+          </a:effectRef>
+          <a:fontRef idx="minor">
+            <a:schemeClr val="lt1"/>
+          </a:fontRef>
+        </p:style>
+        <p:txBody>
+          <a:bodyPr rtlCol="0" anchor="ctr"/>
+          <a:lstStyle/>
+          <a:p>
+            <a:pPr algn="ctr"/>
+            <a:r>
+              <a:rPr lang="en-NL" sz="1100" dirty="0"/>
+              <a:t>OpenShift creates VMs</a:t>
+            </a:r>
+          </a:p>
+        </p:txBody>
+      </p:sp>
+      <p:cxnSp>
+        <p:nvCxnSpPr>
+          <p:cNvPr id="82" name="Elbow Connector 81">
+            <a:extLst>
+              <a:ext uri="{FF2B5EF4-FFF2-40B4-BE49-F238E27FC236}">
+                <a16:creationId xmlns:a16="http://schemas.microsoft.com/office/drawing/2014/main" id="{4B766DD2-013E-FF4F-AF78-7A692E0AF027}"/>
+              </a:ext>
+            </a:extLst>
+          </p:cNvPr>
+          <p:cNvCxnSpPr>
+            <a:cxnSpLocks/>
+            <a:stCxn id="78" idx="3"/>
+            <a:endCxn id="81" idx="1"/>
+          </p:cNvCxnSpPr>
+          <p:nvPr/>
+        </p:nvCxnSpPr>
+        <p:spPr>
+          <a:xfrm flipV="1">
+            <a:off x="1162431" y="1895327"/>
+            <a:ext cx="2125863" cy="3258849"/>
+          </a:xfrm>
+          <a:prstGeom prst="bentConnector3">
+            <a:avLst>
+              <a:gd name="adj1" fmla="val 62044"/>
+            </a:avLst>
           </a:prstGeom>
           <a:ln w="38100">
             <a:solidFill>
@@ -11553,24 +11907,23 @@
       </p:cxnSp>
       <p:cxnSp>
         <p:nvCxnSpPr>
-          <p:cNvPr id="98" name="Straight Arrow Connector 97">
-            <a:extLst>
-              <a:ext uri="{FF2B5EF4-FFF2-40B4-BE49-F238E27FC236}">
-                <a16:creationId xmlns:a16="http://schemas.microsoft.com/office/drawing/2014/main" id="{C8D43371-C21C-6345-A972-5C7AFF4928B1}"/>
+          <p:cNvPr id="112" name="Straight Arrow Connector 111">
+            <a:extLst>
+              <a:ext uri="{FF2B5EF4-FFF2-40B4-BE49-F238E27FC236}">
+                <a16:creationId xmlns:a16="http://schemas.microsoft.com/office/drawing/2014/main" id="{D4D38B86-E4A6-DC43-BB70-C03D2E360AFA}"/>
               </a:ext>
             </a:extLst>
           </p:cNvPr>
           <p:cNvCxnSpPr>
             <a:cxnSpLocks/>
-            <a:stCxn id="93" idx="2"/>
-            <a:endCxn id="94" idx="0"/>
+            <a:stCxn id="81" idx="3"/>
           </p:cNvCxnSpPr>
           <p:nvPr/>
         </p:nvCxnSpPr>
         <p:spPr>
-          <a:xfrm flipH="1">
-            <a:off x="2184916" y="3163591"/>
-            <a:ext cx="1" cy="271059"/>
+          <a:xfrm>
+            <a:off x="4235062" y="1895327"/>
+            <a:ext cx="2474186" cy="0"/>
           </a:xfrm>
           <a:prstGeom prst="straightConnector1">
             <a:avLst/>
@@ -11597,188 +11950,12 @@
           </a:fontRef>
         </p:style>
       </p:cxnSp>
-      <p:cxnSp>
-        <p:nvCxnSpPr>
-          <p:cNvPr id="101" name="Elbow Connector 100">
-            <a:extLst>
-              <a:ext uri="{FF2B5EF4-FFF2-40B4-BE49-F238E27FC236}">
-                <a16:creationId xmlns:a16="http://schemas.microsoft.com/office/drawing/2014/main" id="{0A686FCC-7172-0544-A74E-F7E1C9FABA26}"/>
-              </a:ext>
-            </a:extLst>
-          </p:cNvPr>
-          <p:cNvCxnSpPr>
-            <a:cxnSpLocks/>
-            <a:stCxn id="94" idx="2"/>
-            <a:endCxn id="12" idx="1"/>
-          </p:cNvCxnSpPr>
-          <p:nvPr/>
-        </p:nvCxnSpPr>
-        <p:spPr>
-          <a:xfrm rot="16200000" flipH="1">
-            <a:off x="1984059" y="4093035"/>
-            <a:ext cx="1274469" cy="872754"/>
-          </a:xfrm>
-          <a:prstGeom prst="bentConnector2">
-            <a:avLst/>
-          </a:prstGeom>
-          <a:ln w="38100">
-            <a:solidFill>
-              <a:schemeClr val="accent6"/>
-            </a:solidFill>
-            <a:tailEnd type="triangle"/>
-          </a:ln>
-        </p:spPr>
-        <p:style>
-          <a:lnRef idx="1">
-            <a:schemeClr val="accent1"/>
-          </a:lnRef>
-          <a:fillRef idx="0">
-            <a:schemeClr val="accent1"/>
-          </a:fillRef>
-          <a:effectRef idx="0">
-            <a:schemeClr val="accent1"/>
-          </a:effectRef>
-          <a:fontRef idx="minor">
-            <a:schemeClr val="tx1"/>
-          </a:fontRef>
-        </p:style>
-      </p:cxnSp>
-      <p:cxnSp>
-        <p:nvCxnSpPr>
-          <p:cNvPr id="42" name="Straight Arrow Connector 41">
-            <a:extLst>
-              <a:ext uri="{FF2B5EF4-FFF2-40B4-BE49-F238E27FC236}">
-                <a16:creationId xmlns:a16="http://schemas.microsoft.com/office/drawing/2014/main" id="{56296071-38EC-F24A-8ADD-E68BFD058EC4}"/>
-              </a:ext>
-            </a:extLst>
-          </p:cNvPr>
-          <p:cNvCxnSpPr>
-            <a:cxnSpLocks/>
-          </p:cNvCxnSpPr>
-          <p:nvPr/>
-        </p:nvCxnSpPr>
-        <p:spPr>
-          <a:xfrm>
-            <a:off x="7847564" y="6281416"/>
-            <a:ext cx="1200159" cy="0"/>
-          </a:xfrm>
-          <a:prstGeom prst="straightConnector1">
-            <a:avLst/>
-          </a:prstGeom>
-          <a:ln w="38100">
-            <a:solidFill>
-              <a:schemeClr val="accent2"/>
-            </a:solidFill>
-            <a:headEnd type="triangle"/>
-            <a:tailEnd type="triangle"/>
-          </a:ln>
-        </p:spPr>
-        <p:style>
-          <a:lnRef idx="1">
-            <a:schemeClr val="accent1"/>
-          </a:lnRef>
-          <a:fillRef idx="0">
-            <a:schemeClr val="accent1"/>
-          </a:fillRef>
-          <a:effectRef idx="0">
-            <a:schemeClr val="accent1"/>
-          </a:effectRef>
-          <a:fontRef idx="minor">
-            <a:schemeClr val="tx1"/>
-          </a:fontRef>
-        </p:style>
-      </p:cxnSp>
-      <p:sp>
-        <p:nvSpPr>
-          <p:cNvPr id="43" name="TextBox 42">
-            <a:extLst>
-              <a:ext uri="{FF2B5EF4-FFF2-40B4-BE49-F238E27FC236}">
-                <a16:creationId xmlns:a16="http://schemas.microsoft.com/office/drawing/2014/main" id="{9687D5F9-72AC-7C44-A2A1-83079E90B0EB}"/>
-              </a:ext>
-            </a:extLst>
-          </p:cNvPr>
-          <p:cNvSpPr txBox="1"/>
-          <p:nvPr/>
-        </p:nvSpPr>
-        <p:spPr>
-          <a:xfrm>
-            <a:off x="9249321" y="6334780"/>
-            <a:ext cx="980525" cy="307777"/>
-          </a:xfrm>
-          <a:prstGeom prst="rect">
-            <a:avLst/>
-          </a:prstGeom>
-          <a:noFill/>
-          <a:ln>
-            <a:noFill/>
-          </a:ln>
-        </p:spPr>
-        <p:txBody>
-          <a:bodyPr wrap="none" rtlCol="0">
-            <a:spAutoFit/>
-          </a:bodyPr>
-          <a:lstStyle/>
-          <a:p>
-            <a:pPr algn="ctr"/>
-            <a:r>
-              <a:rPr lang="en-US" sz="1400" dirty="0"/>
-              <a:t>Post-install</a:t>
-            </a:r>
-            <a:endParaRPr lang="en-NL" sz="1400" dirty="0"/>
-          </a:p>
-        </p:txBody>
-      </p:sp>
-      <p:cxnSp>
-        <p:nvCxnSpPr>
-          <p:cNvPr id="47" name="Straight Arrow Connector 46">
-            <a:extLst>
-              <a:ext uri="{FF2B5EF4-FFF2-40B4-BE49-F238E27FC236}">
-                <a16:creationId xmlns:a16="http://schemas.microsoft.com/office/drawing/2014/main" id="{C8284243-CC0B-D344-A3D0-F69913805489}"/>
-              </a:ext>
-            </a:extLst>
-          </p:cNvPr>
-          <p:cNvCxnSpPr>
-            <a:cxnSpLocks/>
-          </p:cNvCxnSpPr>
-          <p:nvPr/>
-        </p:nvCxnSpPr>
-        <p:spPr>
-          <a:xfrm>
-            <a:off x="9047723" y="6281416"/>
-            <a:ext cx="1251357" cy="0"/>
-          </a:xfrm>
-          <a:prstGeom prst="straightConnector1">
-            <a:avLst/>
-          </a:prstGeom>
-          <a:ln w="38100">
-            <a:solidFill>
-              <a:schemeClr val="accent2"/>
-            </a:solidFill>
-            <a:headEnd type="triangle"/>
-            <a:tailEnd type="triangle"/>
-          </a:ln>
-        </p:spPr>
-        <p:style>
-          <a:lnRef idx="1">
-            <a:schemeClr val="accent1"/>
-          </a:lnRef>
-          <a:fillRef idx="0">
-            <a:schemeClr val="accent1"/>
-          </a:fillRef>
-          <a:effectRef idx="0">
-            <a:schemeClr val="accent1"/>
-          </a:effectRef>
-          <a:fontRef idx="minor">
-            <a:schemeClr val="tx1"/>
-          </a:fontRef>
-        </p:style>
-      </p:cxnSp>
-      <p:sp>
-        <p:nvSpPr>
-          <p:cNvPr id="48" name="Oval 47">
-            <a:extLst>
-              <a:ext uri="{FF2B5EF4-FFF2-40B4-BE49-F238E27FC236}">
-                <a16:creationId xmlns:a16="http://schemas.microsoft.com/office/drawing/2014/main" id="{DEF65D1C-BB80-5241-8DD8-13AEF63D07A4}"/>
+      <p:sp>
+        <p:nvSpPr>
+          <p:cNvPr id="132" name="Rounded Rectangle 131">
+            <a:extLst>
+              <a:ext uri="{FF2B5EF4-FFF2-40B4-BE49-F238E27FC236}">
+                <a16:creationId xmlns:a16="http://schemas.microsoft.com/office/drawing/2014/main" id="{00F099AC-CFC1-0D48-AD39-9BD42C3C0E28}"/>
               </a:ext>
             </a:extLst>
           </p:cNvPr>
@@ -11787,19 +11964,20 @@
         </p:nvSpPr>
         <p:spPr>
           <a:xfrm>
-            <a:off x="8215708" y="5783854"/>
-            <a:ext cx="401715" cy="342295"/>
-          </a:xfrm>
-          <a:prstGeom prst="ellipse">
+            <a:off x="1434034" y="1576029"/>
+            <a:ext cx="849768" cy="789038"/>
+          </a:xfrm>
+          <a:prstGeom prst="roundRect">
             <a:avLst/>
           </a:prstGeom>
           <a:solidFill>
-            <a:schemeClr val="accent3"/>
+            <a:schemeClr val="accent6"/>
           </a:solidFill>
           <a:ln>
             <a:solidFill>
-              <a:schemeClr val="accent2"/>
+              <a:schemeClr val="tx1"/>
             </a:solidFill>
+            <a:prstDash val="dash"/>
           </a:ln>
         </p:spPr>
         <p:style>
@@ -11824,18 +12002,18 @@
           <a:p>
             <a:pPr algn="ctr"/>
             <a:r>
-              <a:rPr lang="en-NL" dirty="0"/>
-              <a:t>4</a:t>
-            </a:r>
-          </a:p>
-        </p:txBody>
-      </p:sp>
-      <p:sp>
-        <p:nvSpPr>
-          <p:cNvPr id="49" name="Oval 48">
-            <a:extLst>
-              <a:ext uri="{FF2B5EF4-FFF2-40B4-BE49-F238E27FC236}">
-                <a16:creationId xmlns:a16="http://schemas.microsoft.com/office/drawing/2014/main" id="{89B77375-8166-E74E-93C6-F684AC3250CA}"/>
+              <a:rPr lang="en-NL" sz="1100" dirty="0"/>
+              <a:t>Create cluster nodes (manual)</a:t>
+            </a:r>
+          </a:p>
+        </p:txBody>
+      </p:sp>
+      <p:sp>
+        <p:nvSpPr>
+          <p:cNvPr id="172" name="Triangle 171">
+            <a:extLst>
+              <a:ext uri="{FF2B5EF4-FFF2-40B4-BE49-F238E27FC236}">
+                <a16:creationId xmlns:a16="http://schemas.microsoft.com/office/drawing/2014/main" id="{326DCD8B-E823-944F-9F4A-823433CE9384}"/>
               </a:ext>
             </a:extLst>
           </p:cNvPr>
@@ -11843,21 +12021,16 @@
           <p:nvPr/>
         </p:nvSpPr>
         <p:spPr>
-          <a:xfrm>
-            <a:off x="9472543" y="5783854"/>
-            <a:ext cx="401715" cy="342295"/>
-          </a:xfrm>
-          <a:prstGeom prst="ellipse">
+          <a:xfrm rot="5400000">
+            <a:off x="4309337" y="5063711"/>
+            <a:ext cx="180000" cy="180000"/>
+          </a:xfrm>
+          <a:prstGeom prst="triangle">
             <a:avLst/>
           </a:prstGeom>
           <a:solidFill>
-            <a:schemeClr val="accent3"/>
+            <a:schemeClr val="accent6"/>
           </a:solidFill>
-          <a:ln>
-            <a:solidFill>
-              <a:schemeClr val="accent2"/>
-            </a:solidFill>
-          </a:ln>
         </p:spPr>
         <p:style>
           <a:lnRef idx="2">
@@ -11880,159 +12053,7 @@
           <a:lstStyle/>
           <a:p>
             <a:pPr algn="ctr"/>
-            <a:r>
-              <a:rPr lang="en-NL" dirty="0"/>
-              <a:t>5</a:t>
-            </a:r>
-          </a:p>
-        </p:txBody>
-      </p:sp>
-      <p:sp>
-        <p:nvSpPr>
-          <p:cNvPr id="50" name="TextBox 49">
-            <a:extLst>
-              <a:ext uri="{FF2B5EF4-FFF2-40B4-BE49-F238E27FC236}">
-                <a16:creationId xmlns:a16="http://schemas.microsoft.com/office/drawing/2014/main" id="{B483331D-9834-B64C-B31A-BBD03968B80B}"/>
-              </a:ext>
-            </a:extLst>
-          </p:cNvPr>
-          <p:cNvSpPr txBox="1"/>
-          <p:nvPr/>
-        </p:nvSpPr>
-        <p:spPr>
-          <a:xfrm>
-            <a:off x="8095432" y="6334780"/>
-            <a:ext cx="738857" cy="307777"/>
-          </a:xfrm>
-          <a:prstGeom prst="rect">
-            <a:avLst/>
-          </a:prstGeom>
-          <a:noFill/>
-          <a:ln>
-            <a:noFill/>
-          </a:ln>
-        </p:spPr>
-        <p:txBody>
-          <a:bodyPr wrap="none" rtlCol="0">
-            <a:spAutoFit/>
-          </a:bodyPr>
-          <a:lstStyle/>
-          <a:p>
-            <a:pPr algn="ctr"/>
-            <a:r>
-              <a:rPr lang="en-US" sz="1400" dirty="0"/>
-              <a:t>Storage</a:t>
-            </a:r>
-            <a:endParaRPr lang="en-NL" sz="1400" dirty="0"/>
-          </a:p>
-        </p:txBody>
-      </p:sp>
-      <p:sp>
-        <p:nvSpPr>
-          <p:cNvPr id="56" name="TextBox 55">
-            <a:extLst>
-              <a:ext uri="{FF2B5EF4-FFF2-40B4-BE49-F238E27FC236}">
-                <a16:creationId xmlns:a16="http://schemas.microsoft.com/office/drawing/2014/main" id="{F37C85B6-E09F-114F-9BB5-24F11989072A}"/>
-              </a:ext>
-            </a:extLst>
-          </p:cNvPr>
-          <p:cNvSpPr txBox="1"/>
-          <p:nvPr/>
-        </p:nvSpPr>
-        <p:spPr>
-          <a:xfrm>
-            <a:off x="178635" y="1041377"/>
-            <a:ext cx="519181" cy="369332"/>
-          </a:xfrm>
-          <a:prstGeom prst="rect">
-            <a:avLst/>
-          </a:prstGeom>
-          <a:noFill/>
-        </p:spPr>
-        <p:txBody>
-          <a:bodyPr wrap="none" rtlCol="0">
-            <a:spAutoFit/>
-          </a:bodyPr>
-          <a:lstStyle/>
-          <a:p>
-            <a:r>
-              <a:rPr lang="en-NL" dirty="0">
-                <a:solidFill>
-                  <a:schemeClr val="accent6"/>
-                </a:solidFill>
-              </a:rPr>
-              <a:t>ESX</a:t>
-            </a:r>
-          </a:p>
-        </p:txBody>
-      </p:sp>
-      <p:sp>
-        <p:nvSpPr>
-          <p:cNvPr id="10" name="TextBox 9">
-            <a:extLst>
-              <a:ext uri="{FF2B5EF4-FFF2-40B4-BE49-F238E27FC236}">
-                <a16:creationId xmlns:a16="http://schemas.microsoft.com/office/drawing/2014/main" id="{89B49D52-9E2F-174F-8414-0E7899417D0F}"/>
-              </a:ext>
-            </a:extLst>
-          </p:cNvPr>
-          <p:cNvSpPr txBox="1"/>
-          <p:nvPr/>
-        </p:nvSpPr>
-        <p:spPr>
-          <a:xfrm>
-            <a:off x="1926454" y="2221063"/>
-            <a:ext cx="619080" cy="261610"/>
-          </a:xfrm>
-          <a:prstGeom prst="rect">
-            <a:avLst/>
-          </a:prstGeom>
-          <a:noFill/>
-        </p:spPr>
-        <p:txBody>
-          <a:bodyPr wrap="none" rtlCol="0">
-            <a:spAutoFit/>
-          </a:bodyPr>
-          <a:lstStyle/>
-          <a:p>
-            <a:r>
-              <a:rPr lang="en-NL" sz="1100" dirty="0"/>
-              <a:t>Manual</a:t>
-            </a:r>
-          </a:p>
-        </p:txBody>
-      </p:sp>
-      <p:sp>
-        <p:nvSpPr>
-          <p:cNvPr id="59" name="TextBox 58">
-            <a:extLst>
-              <a:ext uri="{FF2B5EF4-FFF2-40B4-BE49-F238E27FC236}">
-                <a16:creationId xmlns:a16="http://schemas.microsoft.com/office/drawing/2014/main" id="{488C6BB5-62A1-7C4A-9123-8FD4DFD232C9}"/>
-              </a:ext>
-            </a:extLst>
-          </p:cNvPr>
-          <p:cNvSpPr txBox="1"/>
-          <p:nvPr/>
-        </p:nvSpPr>
-        <p:spPr>
-          <a:xfrm>
-            <a:off x="314937" y="2220070"/>
-            <a:ext cx="777777" cy="261610"/>
-          </a:xfrm>
-          <a:prstGeom prst="rect">
-            <a:avLst/>
-          </a:prstGeom>
-          <a:noFill/>
-        </p:spPr>
-        <p:txBody>
-          <a:bodyPr wrap="none" rtlCol="0">
-            <a:spAutoFit/>
-          </a:bodyPr>
-          <a:lstStyle/>
-          <a:p>
-            <a:r>
-              <a:rPr lang="en-NL" sz="1100" dirty="0"/>
-              <a:t>Automatic</a:t>
-            </a:r>
+            <a:endParaRPr lang="en-NL" dirty="0"/>
           </a:p>
         </p:txBody>
       </p:sp>

</xml_diff>